<commit_message>
finalized interim presentation and updated gantt chart
</commit_message>
<xml_diff>
--- a/FinalYearProject/Interim/Interim Presentation.pptx
+++ b/FinalYearProject/Interim/Interim Presentation.pptx
@@ -16,8 +16,9 @@
     <p:sldId id="259" r:id="rId10"/>
     <p:sldId id="263" r:id="rId11"/>
     <p:sldId id="270" r:id="rId12"/>
-    <p:sldId id="264" r:id="rId13"/>
-    <p:sldId id="265" r:id="rId14"/>
+    <p:sldId id="271" r:id="rId13"/>
+    <p:sldId id="264" r:id="rId14"/>
+    <p:sldId id="265" r:id="rId15"/>
   </p:sldIdLst>
   <p:sldSz cx="12192000" cy="6858000"/>
   <p:notesSz cx="6858000" cy="9144000"/>
@@ -869,7 +870,7 @@
           <a:p>
             <a:fld id="{6760990F-A226-4B18-96D9-8AA9136AD1F5}" type="datetimeFigureOut">
               <a:rPr lang="en-GB" smtClean="0"/>
-              <a:t>11/12/2019</a:t>
+              <a:t>17/12/2019</a:t>
             </a:fld>
             <a:endParaRPr lang="en-GB"/>
           </a:p>
@@ -1120,7 +1121,7 @@
           <a:p>
             <a:fld id="{6760990F-A226-4B18-96D9-8AA9136AD1F5}" type="datetimeFigureOut">
               <a:rPr lang="en-GB" smtClean="0"/>
-              <a:t>11/12/2019</a:t>
+              <a:t>17/12/2019</a:t>
             </a:fld>
             <a:endParaRPr lang="en-GB"/>
           </a:p>
@@ -1434,7 +1435,7 @@
           <a:p>
             <a:fld id="{6760990F-A226-4B18-96D9-8AA9136AD1F5}" type="datetimeFigureOut">
               <a:rPr lang="en-GB" smtClean="0"/>
-              <a:t>11/12/2019</a:t>
+              <a:t>17/12/2019</a:t>
             </a:fld>
             <a:endParaRPr lang="en-GB"/>
           </a:p>
@@ -1767,7 +1768,7 @@
           <a:p>
             <a:fld id="{6760990F-A226-4B18-96D9-8AA9136AD1F5}" type="datetimeFigureOut">
               <a:rPr lang="en-GB" smtClean="0"/>
-              <a:t>11/12/2019</a:t>
+              <a:t>17/12/2019</a:t>
             </a:fld>
             <a:endParaRPr lang="en-GB"/>
           </a:p>
@@ -2081,7 +2082,7 @@
           <a:p>
             <a:fld id="{6760990F-A226-4B18-96D9-8AA9136AD1F5}" type="datetimeFigureOut">
               <a:rPr lang="en-GB" smtClean="0"/>
-              <a:t>11/12/2019</a:t>
+              <a:t>17/12/2019</a:t>
             </a:fld>
             <a:endParaRPr lang="en-GB"/>
           </a:p>
@@ -2474,7 +2475,7 @@
           <a:p>
             <a:fld id="{6760990F-A226-4B18-96D9-8AA9136AD1F5}" type="datetimeFigureOut">
               <a:rPr lang="en-GB" smtClean="0"/>
-              <a:t>11/12/2019</a:t>
+              <a:t>17/12/2019</a:t>
             </a:fld>
             <a:endParaRPr lang="en-GB"/>
           </a:p>
@@ -2644,7 +2645,7 @@
           <a:p>
             <a:fld id="{6760990F-A226-4B18-96D9-8AA9136AD1F5}" type="datetimeFigureOut">
               <a:rPr lang="en-GB" smtClean="0"/>
-              <a:t>11/12/2019</a:t>
+              <a:t>17/12/2019</a:t>
             </a:fld>
             <a:endParaRPr lang="en-GB"/>
           </a:p>
@@ -2824,7 +2825,7 @@
           <a:p>
             <a:fld id="{6760990F-A226-4B18-96D9-8AA9136AD1F5}" type="datetimeFigureOut">
               <a:rPr lang="en-GB" smtClean="0"/>
-              <a:t>11/12/2019</a:t>
+              <a:t>17/12/2019</a:t>
             </a:fld>
             <a:endParaRPr lang="en-GB"/>
           </a:p>
@@ -2994,7 +2995,7 @@
           <a:p>
             <a:fld id="{6760990F-A226-4B18-96D9-8AA9136AD1F5}" type="datetimeFigureOut">
               <a:rPr lang="en-GB" smtClean="0"/>
-              <a:t>11/12/2019</a:t>
+              <a:t>17/12/2019</a:t>
             </a:fld>
             <a:endParaRPr lang="en-GB"/>
           </a:p>
@@ -3241,7 +3242,7 @@
           <a:p>
             <a:fld id="{6760990F-A226-4B18-96D9-8AA9136AD1F5}" type="datetimeFigureOut">
               <a:rPr lang="en-GB" smtClean="0"/>
-              <a:t>11/12/2019</a:t>
+              <a:t>17/12/2019</a:t>
             </a:fld>
             <a:endParaRPr lang="en-GB"/>
           </a:p>
@@ -3473,7 +3474,7 @@
           <a:p>
             <a:fld id="{6760990F-A226-4B18-96D9-8AA9136AD1F5}" type="datetimeFigureOut">
               <a:rPr lang="en-GB" smtClean="0"/>
-              <a:t>11/12/2019</a:t>
+              <a:t>17/12/2019</a:t>
             </a:fld>
             <a:endParaRPr lang="en-GB"/>
           </a:p>
@@ -3847,7 +3848,7 @@
           <a:p>
             <a:fld id="{6760990F-A226-4B18-96D9-8AA9136AD1F5}" type="datetimeFigureOut">
               <a:rPr lang="en-GB" smtClean="0"/>
-              <a:t>11/12/2019</a:t>
+              <a:t>17/12/2019</a:t>
             </a:fld>
             <a:endParaRPr lang="en-GB"/>
           </a:p>
@@ -3970,7 +3971,7 @@
           <a:p>
             <a:fld id="{6760990F-A226-4B18-96D9-8AA9136AD1F5}" type="datetimeFigureOut">
               <a:rPr lang="en-GB" smtClean="0"/>
-              <a:t>11/12/2019</a:t>
+              <a:t>17/12/2019</a:t>
             </a:fld>
             <a:endParaRPr lang="en-GB"/>
           </a:p>
@@ -4065,7 +4066,7 @@
           <a:p>
             <a:fld id="{6760990F-A226-4B18-96D9-8AA9136AD1F5}" type="datetimeFigureOut">
               <a:rPr lang="en-GB" smtClean="0"/>
-              <a:t>11/12/2019</a:t>
+              <a:t>17/12/2019</a:t>
             </a:fld>
             <a:endParaRPr lang="en-GB"/>
           </a:p>
@@ -4320,7 +4321,7 @@
           <a:p>
             <a:fld id="{6760990F-A226-4B18-96D9-8AA9136AD1F5}" type="datetimeFigureOut">
               <a:rPr lang="en-GB" smtClean="0"/>
-              <a:t>11/12/2019</a:t>
+              <a:t>17/12/2019</a:t>
             </a:fld>
             <a:endParaRPr lang="en-GB"/>
           </a:p>
@@ -4625,7 +4626,7 @@
           <a:p>
             <a:fld id="{6760990F-A226-4B18-96D9-8AA9136AD1F5}" type="datetimeFigureOut">
               <a:rPr lang="en-GB" smtClean="0"/>
-              <a:t>11/12/2019</a:t>
+              <a:t>17/12/2019</a:t>
             </a:fld>
             <a:endParaRPr lang="en-GB"/>
           </a:p>
@@ -5327,7 +5328,7 @@
           <a:p>
             <a:fld id="{6760990F-A226-4B18-96D9-8AA9136AD1F5}" type="datetimeFigureOut">
               <a:rPr lang="en-GB" smtClean="0"/>
-              <a:t>11/12/2019</a:t>
+              <a:t>17/12/2019</a:t>
             </a:fld>
             <a:endParaRPr lang="en-GB"/>
           </a:p>
@@ -6312,6 +6313,36 @@
           </a:p>
         </p:txBody>
       </p:sp>
+      <p:pic>
+        <p:nvPicPr>
+          <p:cNvPr id="8" name="Picture 7">
+            <a:extLst>
+              <a:ext uri="{FF2B5EF4-FFF2-40B4-BE49-F238E27FC236}">
+                <a16:creationId xmlns:a16="http://schemas.microsoft.com/office/drawing/2014/main" id="{568F05C2-7009-4632-99A6-B5E8E2B3B5F4}"/>
+              </a:ext>
+            </a:extLst>
+          </p:cNvPr>
+          <p:cNvPicPr>
+            <a:picLocks noChangeAspect="1"/>
+          </p:cNvPicPr>
+          <p:nvPr/>
+        </p:nvPicPr>
+        <p:blipFill>
+          <a:blip r:embed="rId2"/>
+          <a:stretch>
+            <a:fillRect/>
+          </a:stretch>
+        </p:blipFill>
+        <p:spPr>
+          <a:xfrm>
+            <a:off x="795867" y="2441348"/>
+            <a:ext cx="8359602" cy="3319254"/>
+          </a:xfrm>
+          <a:prstGeom prst="rect">
+            <a:avLst/>
+          </a:prstGeom>
+        </p:spPr>
+      </p:pic>
     </p:spTree>
     <p:extLst>
       <p:ext uri="{BB962C8B-B14F-4D97-AF65-F5344CB8AC3E}">
@@ -6373,7 +6404,7 @@
                   </a:schemeClr>
                 </a:solidFill>
               </a:rPr>
-              <a:t>Questions</a:t>
+              <a:t>Future Work</a:t>
             </a:r>
           </a:p>
         </p:txBody>
@@ -6408,8 +6439,238 @@
               </a:solidFill>
             </a:endParaRPr>
           </a:p>
-        </p:txBody>
-      </p:sp>
+          <a:p>
+            <a:r>
+              <a:rPr lang="en-GB" dirty="0">
+                <a:solidFill>
+                  <a:schemeClr val="tx1">
+                    <a:lumMod val="85000"/>
+                    <a:lumOff val="15000"/>
+                  </a:schemeClr>
+                </a:solidFill>
+              </a:rPr>
+              <a:t>Increase efficiency of data retrieval from database</a:t>
+            </a:r>
+          </a:p>
+          <a:p>
+            <a:endParaRPr lang="en-GB" dirty="0">
+              <a:solidFill>
+                <a:schemeClr val="tx1">
+                  <a:lumMod val="85000"/>
+                  <a:lumOff val="15000"/>
+                </a:schemeClr>
+              </a:solidFill>
+            </a:endParaRPr>
+          </a:p>
+          <a:p>
+            <a:endParaRPr lang="en-GB" dirty="0">
+              <a:solidFill>
+                <a:schemeClr val="tx1">
+                  <a:lumMod val="85000"/>
+                  <a:lumOff val="15000"/>
+                </a:schemeClr>
+              </a:solidFill>
+            </a:endParaRPr>
+          </a:p>
+          <a:p>
+            <a:r>
+              <a:rPr lang="en-GB" dirty="0">
+                <a:solidFill>
+                  <a:schemeClr val="tx1">
+                    <a:lumMod val="85000"/>
+                    <a:lumOff val="15000"/>
+                  </a:schemeClr>
+                </a:solidFill>
+              </a:rPr>
+              <a:t>Implement minigames</a:t>
+            </a:r>
+          </a:p>
+          <a:p>
+            <a:endParaRPr lang="en-GB" dirty="0">
+              <a:solidFill>
+                <a:schemeClr val="tx1">
+                  <a:lumMod val="85000"/>
+                  <a:lumOff val="15000"/>
+                </a:schemeClr>
+              </a:solidFill>
+            </a:endParaRPr>
+          </a:p>
+          <a:p>
+            <a:endParaRPr lang="en-GB" dirty="0">
+              <a:solidFill>
+                <a:schemeClr val="tx1">
+                  <a:lumMod val="85000"/>
+                  <a:lumOff val="15000"/>
+                </a:schemeClr>
+              </a:solidFill>
+            </a:endParaRPr>
+          </a:p>
+          <a:p>
+            <a:r>
+              <a:rPr lang="en-GB" dirty="0">
+                <a:solidFill>
+                  <a:schemeClr val="tx1">
+                    <a:lumMod val="85000"/>
+                    <a:lumOff val="15000"/>
+                  </a:schemeClr>
+                </a:solidFill>
+              </a:rPr>
+              <a:t>Flesh out profile, classroom and progression pages</a:t>
+            </a:r>
+          </a:p>
+        </p:txBody>
+      </p:sp>
+    </p:spTree>
+    <p:extLst>
+      <p:ext uri="{BB962C8B-B14F-4D97-AF65-F5344CB8AC3E}">
+        <p14:creationId xmlns:p14="http://schemas.microsoft.com/office/powerpoint/2010/main" val="3267683803"/>
+      </p:ext>
+    </p:extLst>
+  </p:cSld>
+  <p:clrMapOvr>
+    <a:masterClrMapping/>
+  </p:clrMapOvr>
+</p:sld>
+</file>
+
+<file path=ppt/slides/slide13.xml><?xml version="1.0" encoding="utf-8"?>
+<p:sld xmlns:a="http://schemas.openxmlformats.org/drawingml/2006/main" xmlns:r="http://schemas.openxmlformats.org/officeDocument/2006/relationships" xmlns:p="http://schemas.openxmlformats.org/presentationml/2006/main">
+  <p:cSld>
+    <p:spTree>
+      <p:nvGrpSpPr>
+        <p:cNvPr id="1" name=""/>
+        <p:cNvGrpSpPr/>
+        <p:nvPr/>
+      </p:nvGrpSpPr>
+      <p:grpSpPr>
+        <a:xfrm>
+          <a:off x="0" y="0"/>
+          <a:ext cx="0" cy="0"/>
+          <a:chOff x="0" y="0"/>
+          <a:chExt cx="0" cy="0"/>
+        </a:xfrm>
+      </p:grpSpPr>
+      <p:sp>
+        <p:nvSpPr>
+          <p:cNvPr id="2" name="Title 1">
+            <a:extLst>
+              <a:ext uri="{FF2B5EF4-FFF2-40B4-BE49-F238E27FC236}">
+                <a16:creationId xmlns:a16="http://schemas.microsoft.com/office/drawing/2014/main" id="{FCDE8EE1-A24B-4FF4-9929-81A41B69019A}"/>
+              </a:ext>
+            </a:extLst>
+          </p:cNvPr>
+          <p:cNvSpPr>
+            <a:spLocks noGrp="1"/>
+          </p:cNvSpPr>
+          <p:nvPr>
+            <p:ph type="title"/>
+          </p:nvPr>
+        </p:nvSpPr>
+        <p:spPr/>
+        <p:txBody>
+          <a:bodyPr/>
+          <a:lstStyle/>
+          <a:p>
+            <a:pPr algn="ctr"/>
+            <a:r>
+              <a:rPr lang="en-GB" b="1" dirty="0">
+                <a:solidFill>
+                  <a:schemeClr val="tx1">
+                    <a:lumMod val="85000"/>
+                    <a:lumOff val="15000"/>
+                  </a:schemeClr>
+                </a:solidFill>
+              </a:rPr>
+              <a:t>Questions</a:t>
+            </a:r>
+          </a:p>
+        </p:txBody>
+      </p:sp>
+      <p:sp>
+        <p:nvSpPr>
+          <p:cNvPr id="3" name="Content Placeholder 2">
+            <a:extLst>
+              <a:ext uri="{FF2B5EF4-FFF2-40B4-BE49-F238E27FC236}">
+                <a16:creationId xmlns:a16="http://schemas.microsoft.com/office/drawing/2014/main" id="{33E31285-C864-4FBF-B917-281C7AEA649C}"/>
+              </a:ext>
+            </a:extLst>
+          </p:cNvPr>
+          <p:cNvSpPr>
+            <a:spLocks noGrp="1"/>
+          </p:cNvSpPr>
+          <p:nvPr>
+            <p:ph idx="1"/>
+          </p:nvPr>
+        </p:nvSpPr>
+        <p:spPr/>
+        <p:txBody>
+          <a:bodyPr/>
+          <a:lstStyle/>
+          <a:p>
+            <a:pPr marL="0" indent="0">
+              <a:buNone/>
+            </a:pPr>
+            <a:r>
+              <a:rPr lang="en-GB" dirty="0">
+                <a:solidFill>
+                  <a:schemeClr val="tx1">
+                    <a:lumMod val="85000"/>
+                    <a:lumOff val="15000"/>
+                  </a:schemeClr>
+                </a:solidFill>
+              </a:rPr>
+              <a:t> </a:t>
+            </a:r>
+          </a:p>
+        </p:txBody>
+      </p:sp>
+      <p:pic>
+        <p:nvPicPr>
+          <p:cNvPr id="1026" name="Picture 2" descr="Image result for questions?">
+            <a:extLst>
+              <a:ext uri="{FF2B5EF4-FFF2-40B4-BE49-F238E27FC236}">
+                <a16:creationId xmlns:a16="http://schemas.microsoft.com/office/drawing/2014/main" id="{3ED369F4-CE5E-4DBA-8690-BA45F878D52C}"/>
+              </a:ext>
+            </a:extLst>
+          </p:cNvPr>
+          <p:cNvPicPr>
+            <a:picLocks noChangeAspect="1" noChangeArrowheads="1"/>
+          </p:cNvPicPr>
+          <p:nvPr/>
+        </p:nvPicPr>
+        <p:blipFill>
+          <a:blip r:embed="rId2">
+            <a:extLst>
+              <a:ext uri="{28A0092B-C50C-407E-A947-70E740481C1C}">
+                <a14:useLocalDpi xmlns:a14="http://schemas.microsoft.com/office/drawing/2010/main" val="0"/>
+              </a:ext>
+            </a:extLst>
+          </a:blip>
+          <a:srcRect/>
+          <a:stretch>
+            <a:fillRect/>
+          </a:stretch>
+        </p:blipFill>
+        <p:spPr bwMode="auto">
+          <a:xfrm>
+            <a:off x="1136946" y="1930400"/>
+            <a:ext cx="7677443" cy="4562415"/>
+          </a:xfrm>
+          <a:prstGeom prst="rect">
+            <a:avLst/>
+          </a:prstGeom>
+          <a:noFill/>
+          <a:extLst>
+            <a:ext uri="{909E8E84-426E-40DD-AFC4-6F175D3DCCD1}">
+              <a14:hiddenFill xmlns:a14="http://schemas.microsoft.com/office/drawing/2010/main">
+                <a:solidFill>
+                  <a:srgbClr val="FFFFFF"/>
+                </a:solidFill>
+              </a14:hiddenFill>
+            </a:ext>
+          </a:extLst>
+        </p:spPr>
+      </p:pic>
     </p:spTree>
     <p:extLst>
       <p:ext uri="{BB962C8B-B14F-4D97-AF65-F5344CB8AC3E}">
@@ -6423,7 +6684,7 @@
 </p:sld>
 </file>
 
-<file path=ppt/slides/slide13.xml><?xml version="1.0" encoding="utf-8"?>
+<file path=ppt/slides/slide14.xml><?xml version="1.0" encoding="utf-8"?>
 <p:sld xmlns:a="http://schemas.openxmlformats.org/drawingml/2006/main" xmlns:r="http://schemas.openxmlformats.org/officeDocument/2006/relationships" xmlns:p="http://schemas.openxmlformats.org/presentationml/2006/main">
   <p:cSld>
     <p:spTree>
@@ -6819,7 +7080,7 @@
                   </a:schemeClr>
                 </a:solidFill>
               </a:rPr>
-              <a:t>Improve retention of information for the students after class.</a:t>
+              <a:t>Improve retention of information for the students outside of class.</a:t>
             </a:r>
           </a:p>
           <a:p>
@@ -6842,27 +7103,8 @@
                   </a:schemeClr>
                 </a:solidFill>
               </a:rPr>
-              <a:t>Create an application that young students will want to use (</a:t>
-            </a:r>
-            <a:r>
-              <a:rPr lang="en-GB">
-                <a:solidFill>
-                  <a:schemeClr val="tx1">
-                    <a:lumMod val="85000"/>
-                    <a:lumOff val="15000"/>
-                  </a:schemeClr>
-                </a:solidFill>
-              </a:rPr>
-              <a:t>User Experience).</a:t>
-            </a:r>
-            <a:endParaRPr lang="en-GB" dirty="0">
-              <a:solidFill>
-                <a:schemeClr val="tx1">
-                  <a:lumMod val="85000"/>
-                  <a:lumOff val="15000"/>
-                </a:schemeClr>
-              </a:solidFill>
-            </a:endParaRPr>
+              <a:t>Create an application that young students will want to use (User Experience).</a:t>
+            </a:r>
           </a:p>
           <a:p>
             <a:endParaRPr lang="en-GB" dirty="0">
@@ -7388,7 +7630,7 @@
         <p:spPr/>
         <p:txBody>
           <a:bodyPr>
-            <a:normAutofit lnSpcReduction="10000"/>
+            <a:normAutofit fontScale="85000" lnSpcReduction="20000"/>
           </a:bodyPr>
           <a:lstStyle/>
           <a:p>
@@ -7529,6 +7771,19 @@
                 </a:schemeClr>
               </a:solidFill>
             </a:endParaRPr>
+          </a:p>
+          <a:p>
+            <a:r>
+              <a:rPr lang="en-GB" dirty="0">
+                <a:solidFill>
+                  <a:schemeClr val="tx1">
+                    <a:lumMod val="85000"/>
+                    <a:lumOff val="15000"/>
+                  </a:schemeClr>
+                </a:solidFill>
+              </a:rPr>
+              <a:t>Windows 10 Laptop</a:t>
+            </a:r>
           </a:p>
           <a:p>
             <a:endParaRPr lang="en-GB" dirty="0">
@@ -8521,32 +8776,49 @@
       </p:sp>
       <p:pic>
         <p:nvPicPr>
-          <p:cNvPr id="4" name="Picture 3">
+          <p:cNvPr id="2050" name="Picture 2" descr="Image result for arbitrary code">
             <a:extLst>
               <a:ext uri="{FF2B5EF4-FFF2-40B4-BE49-F238E27FC236}">
-                <a16:creationId xmlns:a16="http://schemas.microsoft.com/office/drawing/2014/main" id="{0D128C88-B42B-452B-A1D0-DE6F746FD9FA}"/>
+                <a16:creationId xmlns:a16="http://schemas.microsoft.com/office/drawing/2014/main" id="{17BC0E1A-5893-4918-973B-5E997CE3AFD6}"/>
               </a:ext>
             </a:extLst>
           </p:cNvPr>
           <p:cNvPicPr>
-            <a:picLocks noChangeAspect="1"/>
+            <a:picLocks noChangeAspect="1" noChangeArrowheads="1"/>
           </p:cNvPicPr>
           <p:nvPr/>
         </p:nvPicPr>
         <p:blipFill>
-          <a:blip r:embed="rId2"/>
+          <a:blip r:embed="rId2">
+            <a:extLst>
+              <a:ext uri="{28A0092B-C50C-407E-A947-70E740481C1C}">
+                <a14:useLocalDpi xmlns:a14="http://schemas.microsoft.com/office/drawing/2010/main" val="0"/>
+              </a:ext>
+            </a:extLst>
+          </a:blip>
+          <a:srcRect/>
           <a:stretch>
             <a:fillRect/>
           </a:stretch>
         </p:blipFill>
-        <p:spPr>
+        <p:spPr bwMode="auto">
           <a:xfrm>
-            <a:off x="6096000" y="1769702"/>
-            <a:ext cx="3414786" cy="3318595"/>
+            <a:off x="6096000" y="2489201"/>
+            <a:ext cx="3657600" cy="2438400"/>
           </a:xfrm>
           <a:prstGeom prst="rect">
             <a:avLst/>
           </a:prstGeom>
+          <a:noFill/>
+          <a:extLst>
+            <a:ext uri="{909E8E84-426E-40DD-AFC4-6F175D3DCCD1}">
+              <a14:hiddenFill xmlns:a14="http://schemas.microsoft.com/office/drawing/2010/main">
+                <a:solidFill>
+                  <a:srgbClr val="FFFFFF"/>
+                </a:solidFill>
+              </a14:hiddenFill>
+            </a:ext>
+          </a:extLst>
         </p:spPr>
       </p:pic>
     </p:spTree>

</xml_diff>